<commit_message>
ppt added special rules
</commit_message>
<xml_diff>
--- a/Presentation.pptx
+++ b/Presentation.pptx
@@ -188,7 +188,7 @@
             <a:fld id="{1D8BD707-D9CF-40AE-B4C6-C98DA3205C09}" type="datetimeFigureOut">
               <a:rPr lang="en-US" smtClean="0"/>
               <a:pPr/>
-              <a:t>8/30/2018</a:t>
+              <a:t>8/31/2018</a:t>
             </a:fld>
             <a:endParaRPr lang="en-US"/>
           </a:p>
@@ -715,7 +715,7 @@
             <a:fld id="{1D8BD707-D9CF-40AE-B4C6-C98DA3205C09}" type="datetimeFigureOut">
               <a:rPr lang="en-US" smtClean="0"/>
               <a:pPr/>
-              <a:t>8/30/2018</a:t>
+              <a:t>8/31/2018</a:t>
             </a:fld>
             <a:endParaRPr lang="en-US"/>
           </a:p>
@@ -1031,7 +1031,7 @@
             <a:fld id="{1D8BD707-D9CF-40AE-B4C6-C98DA3205C09}" type="datetimeFigureOut">
               <a:rPr lang="en-US" smtClean="0"/>
               <a:pPr/>
-              <a:t>8/30/2018</a:t>
+              <a:t>8/31/2018</a:t>
             </a:fld>
             <a:endParaRPr lang="en-US"/>
           </a:p>
@@ -1314,7 +1314,7 @@
             <a:fld id="{1D8BD707-D9CF-40AE-B4C6-C98DA3205C09}" type="datetimeFigureOut">
               <a:rPr lang="en-US" smtClean="0"/>
               <a:pPr/>
-              <a:t>8/30/2018</a:t>
+              <a:t>8/31/2018</a:t>
             </a:fld>
             <a:endParaRPr lang="en-US"/>
           </a:p>
@@ -1886,7 +1886,7 @@
             <a:fld id="{1D8BD707-D9CF-40AE-B4C6-C98DA3205C09}" type="datetimeFigureOut">
               <a:rPr lang="en-US" smtClean="0"/>
               <a:pPr/>
-              <a:t>8/30/2018</a:t>
+              <a:t>8/31/2018</a:t>
             </a:fld>
             <a:endParaRPr lang="en-US"/>
           </a:p>
@@ -1978,7 +1978,7 @@
             <a:fld id="{1D8BD707-D9CF-40AE-B4C6-C98DA3205C09}" type="datetimeFigureOut">
               <a:rPr lang="en-US" smtClean="0"/>
               <a:pPr/>
-              <a:t>8/30/2018</a:t>
+              <a:t>8/31/2018</a:t>
             </a:fld>
             <a:endParaRPr lang="en-US"/>
           </a:p>
@@ -2689,7 +2689,7 @@
             <a:fld id="{1D8BD707-D9CF-40AE-B4C6-C98DA3205C09}" type="datetimeFigureOut">
               <a:rPr lang="en-US" smtClean="0"/>
               <a:pPr/>
-              <a:t>8/30/2018</a:t>
+              <a:t>8/31/2018</a:t>
             </a:fld>
             <a:endParaRPr lang="en-US"/>
           </a:p>
@@ -2943,7 +2943,7 @@
             <a:fld id="{1D8BD707-D9CF-40AE-B4C6-C98DA3205C09}" type="datetimeFigureOut">
               <a:rPr lang="en-US" smtClean="0"/>
               <a:pPr/>
-              <a:t>8/30/2018</a:t>
+              <a:t>8/31/2018</a:t>
             </a:fld>
             <a:endParaRPr lang="en-US"/>
           </a:p>
@@ -3174,7 +3174,7 @@
             <a:fld id="{1D8BD707-D9CF-40AE-B4C6-C98DA3205C09}" type="datetimeFigureOut">
               <a:rPr lang="en-US" smtClean="0"/>
               <a:pPr/>
-              <a:t>8/30/2018</a:t>
+              <a:t>8/31/2018</a:t>
             </a:fld>
             <a:endParaRPr lang="en-US"/>
           </a:p>
@@ -3450,7 +3450,7 @@
             <a:fld id="{1D8BD707-D9CF-40AE-B4C6-C98DA3205C09}" type="datetimeFigureOut">
               <a:rPr lang="en-US" smtClean="0"/>
               <a:pPr/>
-              <a:t>8/30/2018</a:t>
+              <a:t>8/31/2018</a:t>
             </a:fld>
             <a:endParaRPr lang="en-US"/>
           </a:p>
@@ -3738,7 +3738,7 @@
             <a:fld id="{1D8BD707-D9CF-40AE-B4C6-C98DA3205C09}" type="datetimeFigureOut">
               <a:rPr lang="en-US" smtClean="0"/>
               <a:pPr/>
-              <a:t>8/30/2018</a:t>
+              <a:t>8/31/2018</a:t>
             </a:fld>
             <a:endParaRPr lang="en-US"/>
           </a:p>
@@ -4008,7 +4008,7 @@
             <a:fld id="{1D8BD707-D9CF-40AE-B4C6-C98DA3205C09}" type="datetimeFigureOut">
               <a:rPr lang="en-US" smtClean="0"/>
               <a:pPr/>
-              <a:t>8/30/2018</a:t>
+              <a:t>8/31/2018</a:t>
             </a:fld>
             <a:endParaRPr lang="en-US"/>
           </a:p>
@@ -4547,13 +4547,13 @@
   <p:clrMapOvr>
     <a:masterClrMapping/>
   </p:clrMapOvr>
-  <mc:AlternateContent xmlns:mc="http://schemas.openxmlformats.org/markup-compatibility/2006">
-    <mc:Choice xmlns:p14="http://schemas.microsoft.com/office/powerpoint/2010/main" Requires="p14">
+  <mc:AlternateContent xmlns:mc="http://schemas.openxmlformats.org/markup-compatibility/2006" xmlns:p14="http://schemas.microsoft.com/office/powerpoint/2010/main">
+    <mc:Choice Requires="p14">
       <p:transition spd="slow" p14:dur="1500">
         <p:split orient="vert"/>
       </p:transition>
     </mc:Choice>
-    <mc:Fallback>
+    <mc:Fallback xmlns="">
       <p:transition spd="slow">
         <p:split orient="vert"/>
       </p:transition>
@@ -4678,18 +4678,23 @@
             <p:ph idx="1"/>
           </p:nvPr>
         </p:nvSpPr>
-        <p:spPr/>
+        <p:spPr>
+          <a:xfrm>
+            <a:off x="381000" y="2209801"/>
+            <a:ext cx="7745505" cy="1828799"/>
+          </a:xfrm>
+        </p:spPr>
         <p:txBody>
           <a:bodyPr>
-            <a:normAutofit fontScale="92500"/>
+            <a:normAutofit/>
           </a:bodyPr>
           <a:lstStyle/>
           <a:p>
             <a:r>
-              <a:rPr lang="en-US" b="1" u="sng" dirty="0" smtClean="0"/>
+              <a:rPr lang="en-US" sz="2000" b="1" u="sng" dirty="0" smtClean="0"/>
               <a:t>RESTRICTION IN ROATING ROOMS: </a:t>
             </a:r>
-            <a:endParaRPr lang="en-US" dirty="0"/>
+            <a:endParaRPr lang="en-US" sz="2000" dirty="0"/>
           </a:p>
           <a:p>
             <a:pPr lvl="1">
@@ -4697,7 +4702,7 @@
               <a:buChar char="ü"/>
             </a:pPr>
             <a:r>
-              <a:rPr lang="en-US" dirty="0"/>
+              <a:rPr lang="en-US" sz="2000" dirty="0"/>
               <a:t>The rooms can be rotated only clockwise 90º .</a:t>
             </a:r>
           </a:p>
@@ -4707,7 +4712,7 @@
               <a:buChar char="ü"/>
             </a:pPr>
             <a:r>
-              <a:rPr lang="en-US" dirty="0"/>
+              <a:rPr lang="en-US" sz="2000" dirty="0"/>
               <a:t>A player cannot use rotation gears in consecutive moves.</a:t>
             </a:r>
           </a:p>
@@ -4717,64 +4722,11 @@
               <a:buChar char="ü"/>
             </a:pPr>
             <a:r>
-              <a:rPr lang="en-US" dirty="0"/>
+              <a:rPr lang="en-US" sz="2000" dirty="0"/>
               <a:t>A room cannot be rotated if the opponent’s King is present in that room.</a:t>
             </a:r>
           </a:p>
           <a:p>
-            <a:r>
-              <a:rPr lang="en-US" b="1" u="sng" dirty="0" smtClean="0"/>
-              <a:t>ROTATION RESTRICTIONS:</a:t>
-            </a:r>
-            <a:r>
-              <a:rPr lang="en-US" dirty="0" smtClean="0"/>
-              <a:t> </a:t>
-            </a:r>
-          </a:p>
-          <a:p>
-            <a:pPr lvl="1">
-              <a:buFont typeface="Wingdings" panose="05000000000000000000" pitchFamily="2" charset="2"/>
-              <a:buChar char="ü"/>
-            </a:pPr>
-            <a:r>
-              <a:rPr lang="en-US" dirty="0" smtClean="0"/>
-              <a:t>The rooms can be rotated only clockwise 90</a:t>
-            </a:r>
-            <a:r>
-              <a:rPr lang="en-US" dirty="0" smtClean="0">
-                <a:latin typeface="Book Antiqua"/>
-              </a:rPr>
-              <a:t>º .</a:t>
-            </a:r>
-          </a:p>
-          <a:p>
-            <a:pPr lvl="1">
-              <a:buFont typeface="Wingdings" panose="05000000000000000000" pitchFamily="2" charset="2"/>
-              <a:buChar char="ü"/>
-            </a:pPr>
-            <a:r>
-              <a:rPr lang="en-US" dirty="0" smtClean="0">
-                <a:latin typeface="Book Antiqua"/>
-              </a:rPr>
-              <a:t>A player cannot use rotation gears in consecutive moves.</a:t>
-            </a:r>
-          </a:p>
-          <a:p>
-            <a:pPr lvl="1">
-              <a:buFont typeface="Wingdings" panose="05000000000000000000" pitchFamily="2" charset="2"/>
-              <a:buChar char="ü"/>
-            </a:pPr>
-            <a:r>
-              <a:rPr lang="en-US" dirty="0" smtClean="0">
-                <a:latin typeface="Book Antiqua"/>
-              </a:rPr>
-              <a:t>A room cannot be rotated if the opponent’s King is present in that room.</a:t>
-            </a:r>
-          </a:p>
-          <a:p>
-            <a:pPr marL="0" indent="0">
-              <a:buNone/>
-            </a:pPr>
             <a:endParaRPr lang="en-US" dirty="0" smtClean="0"/>
           </a:p>
         </p:txBody>
@@ -4803,6 +4755,706 @@
               <a:t> Rules</a:t>
             </a:r>
             <a:endParaRPr lang="en-US" dirty="0"/>
+          </a:p>
+        </p:txBody>
+      </p:sp>
+      <p:pic>
+        <p:nvPicPr>
+          <p:cNvPr id="1026" name="Picture 2"/>
+          <p:cNvPicPr>
+            <a:picLocks noChangeAspect="1" noChangeArrowheads="1"/>
+          </p:cNvPicPr>
+          <p:nvPr/>
+        </p:nvPicPr>
+        <p:blipFill rotWithShape="1">
+          <a:blip r:embed="rId2">
+            <a:extLst>
+              <a:ext uri="{28A0092B-C50C-407E-A947-70E740481C1C}">
+                <a14:useLocalDpi xmlns:a14="http://schemas.microsoft.com/office/drawing/2010/main" val="0"/>
+              </a:ext>
+            </a:extLst>
+          </a:blip>
+          <a:srcRect r="-896" b="373"/>
+          <a:stretch/>
+        </p:blipFill>
+        <p:spPr bwMode="auto">
+          <a:xfrm>
+            <a:off x="6477000" y="4267200"/>
+            <a:ext cx="2229612" cy="2239518"/>
+          </a:xfrm>
+          <a:prstGeom prst="rect">
+            <a:avLst/>
+          </a:prstGeom>
+          <a:noFill/>
+          <a:ln>
+            <a:noFill/>
+          </a:ln>
+          <a:extLst>
+            <a:ext uri="{909E8E84-426E-40DD-AFC4-6F175D3DCCD1}">
+              <a14:hiddenFill xmlns:a14="http://schemas.microsoft.com/office/drawing/2010/main">
+                <a:solidFill>
+                  <a:schemeClr val="accent1"/>
+                </a:solidFill>
+              </a14:hiddenFill>
+            </a:ext>
+            <a:ext uri="{91240B29-F687-4F45-9708-019B960494DF}">
+              <a14:hiddenLine xmlns:a14="http://schemas.microsoft.com/office/drawing/2010/main" w="9525">
+                <a:solidFill>
+                  <a:schemeClr val="tx1"/>
+                </a:solidFill>
+                <a:miter lim="800000"/>
+                <a:headEnd/>
+                <a:tailEnd/>
+              </a14:hiddenLine>
+            </a:ext>
+          </a:extLst>
+        </p:spPr>
+      </p:pic>
+      <p:sp>
+        <p:nvSpPr>
+          <p:cNvPr id="6" name="Content Placeholder 2"/>
+          <p:cNvSpPr txBox="1">
+            <a:spLocks/>
+          </p:cNvSpPr>
+          <p:nvPr/>
+        </p:nvSpPr>
+        <p:spPr>
+          <a:xfrm>
+            <a:off x="457201" y="4038600"/>
+            <a:ext cx="5791200" cy="3877815"/>
+          </a:xfrm>
+          <a:prstGeom prst="rect">
+            <a:avLst/>
+          </a:prstGeom>
+        </p:spPr>
+        <p:txBody>
+          <a:bodyPr vert="horz" lIns="91440" tIns="45720" rIns="91440" bIns="45720" rtlCol="0">
+            <a:normAutofit/>
+          </a:bodyPr>
+          <a:lstStyle>
+            <a:lvl1pPr marL="365760" indent="-365760" algn="l" defTabSz="914400" rtl="0" eaLnBrk="1" latinLnBrk="0" hangingPunct="1">
+              <a:spcBef>
+                <a:spcPct val="20000"/>
+              </a:spcBef>
+              <a:buClr>
+                <a:schemeClr val="accent1"/>
+              </a:buClr>
+              <a:buFont typeface="Wingdings" pitchFamily="2" charset="2"/>
+              <a:buChar char=""/>
+              <a:defRPr sz="2400" kern="1200">
+                <a:solidFill>
+                  <a:schemeClr val="tx1">
+                    <a:lumMod val="85000"/>
+                    <a:lumOff val="15000"/>
+                  </a:schemeClr>
+                </a:solidFill>
+                <a:latin typeface="+mn-lt"/>
+                <a:ea typeface="+mn-ea"/>
+                <a:cs typeface="+mn-cs"/>
+              </a:defRPr>
+            </a:lvl1pPr>
+            <a:lvl2pPr marL="777240" indent="-365760" algn="l" defTabSz="914400" rtl="0" eaLnBrk="1" latinLnBrk="0" hangingPunct="1">
+              <a:spcBef>
+                <a:spcPct val="20000"/>
+              </a:spcBef>
+              <a:buClr>
+                <a:schemeClr val="accent1"/>
+              </a:buClr>
+              <a:buFont typeface="Wingdings" pitchFamily="2" charset="2"/>
+              <a:buChar char=""/>
+              <a:defRPr sz="2200" kern="1200">
+                <a:solidFill>
+                  <a:schemeClr val="tx1">
+                    <a:lumMod val="85000"/>
+                    <a:lumOff val="15000"/>
+                  </a:schemeClr>
+                </a:solidFill>
+                <a:latin typeface="+mn-lt"/>
+                <a:ea typeface="+mn-ea"/>
+                <a:cs typeface="+mn-cs"/>
+              </a:defRPr>
+            </a:lvl2pPr>
+            <a:lvl3pPr marL="1143000" indent="-365760" algn="l" defTabSz="914400" rtl="0" eaLnBrk="1" latinLnBrk="0" hangingPunct="1">
+              <a:spcBef>
+                <a:spcPct val="20000"/>
+              </a:spcBef>
+              <a:buClr>
+                <a:schemeClr val="accent1"/>
+              </a:buClr>
+              <a:buFont typeface="Wingdings" pitchFamily="2" charset="2"/>
+              <a:buChar char=""/>
+              <a:defRPr sz="2000" kern="1200">
+                <a:solidFill>
+                  <a:schemeClr val="tx1">
+                    <a:lumMod val="85000"/>
+                    <a:lumOff val="15000"/>
+                  </a:schemeClr>
+                </a:solidFill>
+                <a:latin typeface="+mn-lt"/>
+                <a:ea typeface="+mn-ea"/>
+                <a:cs typeface="+mn-cs"/>
+              </a:defRPr>
+            </a:lvl3pPr>
+            <a:lvl4pPr marL="1508760" indent="-320040" algn="l" defTabSz="914400" rtl="0" eaLnBrk="1" latinLnBrk="0" hangingPunct="1">
+              <a:spcBef>
+                <a:spcPct val="20000"/>
+              </a:spcBef>
+              <a:buClr>
+                <a:schemeClr val="accent1"/>
+              </a:buClr>
+              <a:buFont typeface="Wingdings" pitchFamily="2" charset="2"/>
+              <a:buChar char=""/>
+              <a:defRPr sz="1800" kern="1200">
+                <a:solidFill>
+                  <a:schemeClr val="tx1">
+                    <a:lumMod val="85000"/>
+                    <a:lumOff val="15000"/>
+                  </a:schemeClr>
+                </a:solidFill>
+                <a:latin typeface="+mn-lt"/>
+                <a:ea typeface="+mn-ea"/>
+                <a:cs typeface="+mn-cs"/>
+              </a:defRPr>
+            </a:lvl4pPr>
+            <a:lvl5pPr marL="1828800" indent="-320040" algn="l" defTabSz="914400" rtl="0" eaLnBrk="1" latinLnBrk="0" hangingPunct="1">
+              <a:spcBef>
+                <a:spcPct val="20000"/>
+              </a:spcBef>
+              <a:buClr>
+                <a:schemeClr val="accent1"/>
+              </a:buClr>
+              <a:buFont typeface="Wingdings" pitchFamily="2" charset="2"/>
+              <a:buChar char=""/>
+              <a:defRPr sz="1600" kern="1200">
+                <a:solidFill>
+                  <a:schemeClr val="tx1">
+                    <a:lumMod val="85000"/>
+                    <a:lumOff val="15000"/>
+                  </a:schemeClr>
+                </a:solidFill>
+                <a:latin typeface="+mn-lt"/>
+                <a:ea typeface="+mn-ea"/>
+                <a:cs typeface="+mn-cs"/>
+              </a:defRPr>
+            </a:lvl5pPr>
+            <a:lvl6pPr marL="2148840" indent="-274320" algn="l" defTabSz="914400" rtl="0" eaLnBrk="1" latinLnBrk="0" hangingPunct="1">
+              <a:spcBef>
+                <a:spcPts val="400"/>
+              </a:spcBef>
+              <a:buClr>
+                <a:schemeClr val="accent1"/>
+              </a:buClr>
+              <a:buFont typeface="Wingdings" pitchFamily="2" charset="2"/>
+              <a:buChar char=""/>
+              <a:defRPr sz="1400" kern="1200">
+                <a:solidFill>
+                  <a:schemeClr val="tx1"/>
+                </a:solidFill>
+                <a:latin typeface="+mn-lt"/>
+                <a:ea typeface="+mn-ea"/>
+                <a:cs typeface="+mn-cs"/>
+              </a:defRPr>
+            </a:lvl6pPr>
+            <a:lvl7pPr marL="2468880" indent="-274320" algn="l" defTabSz="914400" rtl="0" eaLnBrk="1" latinLnBrk="0" hangingPunct="1">
+              <a:spcBef>
+                <a:spcPts val="400"/>
+              </a:spcBef>
+              <a:buClr>
+                <a:schemeClr val="accent1"/>
+              </a:buClr>
+              <a:buFont typeface="Wingdings" pitchFamily="2" charset="2"/>
+              <a:buChar char=""/>
+              <a:defRPr sz="1400" kern="1200">
+                <a:solidFill>
+                  <a:schemeClr val="tx1"/>
+                </a:solidFill>
+                <a:latin typeface="+mn-lt"/>
+                <a:ea typeface="+mn-ea"/>
+                <a:cs typeface="+mn-cs"/>
+              </a:defRPr>
+            </a:lvl7pPr>
+            <a:lvl8pPr marL="2788920" indent="-274320" algn="l" defTabSz="914400" rtl="0" eaLnBrk="1" latinLnBrk="0" hangingPunct="1">
+              <a:spcBef>
+                <a:spcPts val="400"/>
+              </a:spcBef>
+              <a:buClr>
+                <a:schemeClr val="accent1"/>
+              </a:buClr>
+              <a:buFont typeface="Wingdings" pitchFamily="2" charset="2"/>
+              <a:buChar char=""/>
+              <a:defRPr sz="1400" kern="1200">
+                <a:solidFill>
+                  <a:schemeClr val="tx1"/>
+                </a:solidFill>
+                <a:latin typeface="+mn-lt"/>
+                <a:ea typeface="+mn-ea"/>
+                <a:cs typeface="+mn-cs"/>
+              </a:defRPr>
+            </a:lvl8pPr>
+            <a:lvl9pPr marL="3108960" indent="-274320" algn="l" defTabSz="914400" rtl="0" eaLnBrk="1" latinLnBrk="0" hangingPunct="1">
+              <a:spcBef>
+                <a:spcPts val="400"/>
+              </a:spcBef>
+              <a:buClr>
+                <a:schemeClr val="accent1"/>
+              </a:buClr>
+              <a:buFont typeface="Wingdings" pitchFamily="2" charset="2"/>
+              <a:buChar char=""/>
+              <a:defRPr sz="1400" kern="1200">
+                <a:solidFill>
+                  <a:schemeClr val="tx1"/>
+                </a:solidFill>
+                <a:latin typeface="+mn-lt"/>
+                <a:ea typeface="+mn-ea"/>
+                <a:cs typeface="+mn-cs"/>
+              </a:defRPr>
+            </a:lvl9pPr>
+          </a:lstStyle>
+          <a:p>
+            <a:r>
+              <a:rPr lang="en-US" b="1" u="sng" dirty="0" smtClean="0"/>
+              <a:t>MOVEMENT </a:t>
+            </a:r>
+            <a:r>
+              <a:rPr lang="en-US" b="1" u="sng" dirty="0"/>
+              <a:t>OF THE BISHOP: </a:t>
+            </a:r>
+          </a:p>
+          <a:p>
+            <a:pPr lvl="1">
+              <a:buFont typeface="Wingdings" panose="05000000000000000000" pitchFamily="2" charset="2"/>
+              <a:buChar char="ü"/>
+            </a:pPr>
+            <a:r>
+              <a:rPr lang="en-US" dirty="0"/>
+              <a:t>The bishop cannot cross a </a:t>
+            </a:r>
+            <a:r>
+              <a:rPr lang="en-US" dirty="0" smtClean="0"/>
+              <a:t>cornered wall as shown in move A.</a:t>
+            </a:r>
+          </a:p>
+          <a:p>
+            <a:pPr lvl="1">
+              <a:buFont typeface="Wingdings" panose="05000000000000000000" pitchFamily="2" charset="2"/>
+              <a:buChar char="ü"/>
+            </a:pPr>
+            <a:r>
+              <a:rPr lang="en-US" dirty="0" smtClean="0"/>
+              <a:t>The bishop can however cross a single wall from the edge as shown in move B , but not move C.</a:t>
+            </a:r>
+            <a:endParaRPr lang="en-US" dirty="0"/>
+          </a:p>
+          <a:p>
+            <a:endParaRPr lang="en-US" dirty="0" smtClean="0"/>
+          </a:p>
+        </p:txBody>
+      </p:sp>
+      <p:cxnSp>
+        <p:nvCxnSpPr>
+          <p:cNvPr id="7" name="Straight Arrow Connector 6"/>
+          <p:cNvCxnSpPr/>
+          <p:nvPr/>
+        </p:nvCxnSpPr>
+        <p:spPr>
+          <a:xfrm flipV="1">
+            <a:off x="7696200" y="4648200"/>
+            <a:ext cx="609600" cy="609600"/>
+          </a:xfrm>
+          <a:prstGeom prst="straightConnector1">
+            <a:avLst/>
+          </a:prstGeom>
+          <a:ln>
+            <a:tailEnd type="arrow"/>
+          </a:ln>
+        </p:spPr>
+        <p:style>
+          <a:lnRef idx="1">
+            <a:schemeClr val="accent1"/>
+          </a:lnRef>
+          <a:fillRef idx="0">
+            <a:schemeClr val="accent1"/>
+          </a:fillRef>
+          <a:effectRef idx="0">
+            <a:schemeClr val="accent1"/>
+          </a:effectRef>
+          <a:fontRef idx="minor">
+            <a:schemeClr val="tx1"/>
+          </a:fontRef>
+        </p:style>
+      </p:cxnSp>
+      <p:cxnSp>
+        <p:nvCxnSpPr>
+          <p:cNvPr id="9" name="Straight Arrow Connector 8"/>
+          <p:cNvCxnSpPr/>
+          <p:nvPr/>
+        </p:nvCxnSpPr>
+        <p:spPr>
+          <a:xfrm>
+            <a:off x="7696200" y="5486400"/>
+            <a:ext cx="609600" cy="685800"/>
+          </a:xfrm>
+          <a:prstGeom prst="straightConnector1">
+            <a:avLst/>
+          </a:prstGeom>
+          <a:ln>
+            <a:tailEnd type="arrow"/>
+          </a:ln>
+        </p:spPr>
+        <p:style>
+          <a:lnRef idx="1">
+            <a:schemeClr val="accent1"/>
+          </a:lnRef>
+          <a:fillRef idx="0">
+            <a:schemeClr val="accent1"/>
+          </a:fillRef>
+          <a:effectRef idx="0">
+            <a:schemeClr val="accent1"/>
+          </a:effectRef>
+          <a:fontRef idx="minor">
+            <a:schemeClr val="tx1"/>
+          </a:fontRef>
+        </p:style>
+      </p:cxnSp>
+      <p:cxnSp>
+        <p:nvCxnSpPr>
+          <p:cNvPr id="11" name="Straight Arrow Connector 10"/>
+          <p:cNvCxnSpPr/>
+          <p:nvPr/>
+        </p:nvCxnSpPr>
+        <p:spPr>
+          <a:xfrm flipH="1" flipV="1">
+            <a:off x="6781800" y="4572000"/>
+            <a:ext cx="609600" cy="738759"/>
+          </a:xfrm>
+          <a:prstGeom prst="straightConnector1">
+            <a:avLst/>
+          </a:prstGeom>
+          <a:ln>
+            <a:tailEnd type="arrow"/>
+          </a:ln>
+        </p:spPr>
+        <p:style>
+          <a:lnRef idx="1">
+            <a:schemeClr val="accent1"/>
+          </a:lnRef>
+          <a:fillRef idx="0">
+            <a:schemeClr val="accent1"/>
+          </a:fillRef>
+          <a:effectRef idx="0">
+            <a:schemeClr val="accent1"/>
+          </a:effectRef>
+          <a:fontRef idx="minor">
+            <a:schemeClr val="tx1"/>
+          </a:fontRef>
+        </p:style>
+      </p:cxnSp>
+      <p:sp>
+        <p:nvSpPr>
+          <p:cNvPr id="12" name="Multiply 11"/>
+          <p:cNvSpPr/>
+          <p:nvPr/>
+        </p:nvSpPr>
+        <p:spPr>
+          <a:xfrm rot="20705000">
+            <a:off x="7837745" y="4700626"/>
+            <a:ext cx="457201" cy="381000"/>
+          </a:xfrm>
+          <a:prstGeom prst="mathMultiply">
+            <a:avLst>
+              <a:gd name="adj1" fmla="val 9120"/>
+            </a:avLst>
+          </a:prstGeom>
+          <a:solidFill>
+            <a:srgbClr val="FF0000"/>
+          </a:solidFill>
+        </p:spPr>
+        <p:style>
+          <a:lnRef idx="2">
+            <a:schemeClr val="accent1">
+              <a:shade val="50000"/>
+            </a:schemeClr>
+          </a:lnRef>
+          <a:fillRef idx="1">
+            <a:schemeClr val="accent1"/>
+          </a:fillRef>
+          <a:effectRef idx="0">
+            <a:schemeClr val="accent1"/>
+          </a:effectRef>
+          <a:fontRef idx="minor">
+            <a:schemeClr val="lt1"/>
+          </a:fontRef>
+        </p:style>
+        <p:txBody>
+          <a:bodyPr rtlCol="0" anchor="ctr"/>
+          <a:lstStyle/>
+          <a:p>
+            <a:pPr algn="ctr"/>
+            <a:endParaRPr lang="en-US" dirty="0" smtClean="0">
+              <a:ln>
+                <a:solidFill>
+                  <a:srgbClr val="FF0000"/>
+                </a:solidFill>
+              </a:ln>
+              <a:solidFill>
+                <a:srgbClr val="FF0000"/>
+              </a:solidFill>
+            </a:endParaRPr>
+          </a:p>
+          <a:p>
+            <a:pPr algn="ctr"/>
+            <a:endParaRPr lang="en-US" dirty="0">
+              <a:ln>
+                <a:solidFill>
+                  <a:srgbClr val="FF0000"/>
+                </a:solidFill>
+              </a:ln>
+              <a:solidFill>
+                <a:srgbClr val="FF0000"/>
+              </a:solidFill>
+            </a:endParaRPr>
+          </a:p>
+        </p:txBody>
+      </p:sp>
+      <p:sp>
+        <p:nvSpPr>
+          <p:cNvPr id="14" name="Multiply 13"/>
+          <p:cNvSpPr/>
+          <p:nvPr/>
+        </p:nvSpPr>
+        <p:spPr>
+          <a:xfrm rot="20705000">
+            <a:off x="7807265" y="5662574"/>
+            <a:ext cx="457201" cy="381000"/>
+          </a:xfrm>
+          <a:prstGeom prst="mathMultiply">
+            <a:avLst>
+              <a:gd name="adj1" fmla="val 9120"/>
+            </a:avLst>
+          </a:prstGeom>
+          <a:solidFill>
+            <a:srgbClr val="FF0000"/>
+          </a:solidFill>
+        </p:spPr>
+        <p:style>
+          <a:lnRef idx="2">
+            <a:schemeClr val="accent1">
+              <a:shade val="50000"/>
+            </a:schemeClr>
+          </a:lnRef>
+          <a:fillRef idx="1">
+            <a:schemeClr val="accent1"/>
+          </a:fillRef>
+          <a:effectRef idx="0">
+            <a:schemeClr val="accent1"/>
+          </a:effectRef>
+          <a:fontRef idx="minor">
+            <a:schemeClr val="lt1"/>
+          </a:fontRef>
+        </p:style>
+        <p:txBody>
+          <a:bodyPr rtlCol="0" anchor="ctr"/>
+          <a:lstStyle/>
+          <a:p>
+            <a:pPr algn="ctr"/>
+            <a:endParaRPr lang="en-US" dirty="0" smtClean="0">
+              <a:ln>
+                <a:solidFill>
+                  <a:srgbClr val="FF0000"/>
+                </a:solidFill>
+              </a:ln>
+              <a:solidFill>
+                <a:srgbClr val="FF0000"/>
+              </a:solidFill>
+            </a:endParaRPr>
+          </a:p>
+          <a:p>
+            <a:pPr algn="ctr"/>
+            <a:endParaRPr lang="en-US" dirty="0">
+              <a:ln>
+                <a:solidFill>
+                  <a:srgbClr val="FF0000"/>
+                </a:solidFill>
+              </a:ln>
+              <a:solidFill>
+                <a:srgbClr val="FF0000"/>
+              </a:solidFill>
+            </a:endParaRPr>
+          </a:p>
+        </p:txBody>
+      </p:sp>
+      <p:sp>
+        <p:nvSpPr>
+          <p:cNvPr id="13" name="Rectangle 12"/>
+          <p:cNvSpPr/>
+          <p:nvPr/>
+        </p:nvSpPr>
+        <p:spPr>
+          <a:xfrm>
+            <a:off x="8315481" y="4343400"/>
+            <a:ext cx="218919" cy="461665"/>
+          </a:xfrm>
+          <a:prstGeom prst="rect">
+            <a:avLst/>
+          </a:prstGeom>
+          <a:noFill/>
+        </p:spPr>
+        <p:txBody>
+          <a:bodyPr wrap="square" lIns="91440" tIns="45720" rIns="91440" bIns="45720">
+            <a:spAutoFit/>
+            <a:scene3d>
+              <a:camera prst="orthographicFront"/>
+              <a:lightRig rig="balanced" dir="t">
+                <a:rot lat="0" lon="0" rev="2100000"/>
+              </a:lightRig>
+            </a:scene3d>
+            <a:sp3d extrusionH="57150" prstMaterial="metal">
+              <a:bevelT w="38100" h="25400"/>
+              <a:contourClr>
+                <a:schemeClr val="bg2"/>
+              </a:contourClr>
+            </a:sp3d>
+          </a:bodyPr>
+          <a:lstStyle/>
+          <a:p>
+            <a:pPr algn="ctr"/>
+            <a:r>
+              <a:rPr lang="en-US" sz="2400" b="1" cap="none" spc="0" dirty="0" smtClean="0">
+                <a:ln w="50800"/>
+                <a:solidFill>
+                  <a:schemeClr val="bg1">
+                    <a:shade val="50000"/>
+                  </a:schemeClr>
+                </a:solidFill>
+                <a:effectLst/>
+              </a:rPr>
+              <a:t>A</a:t>
+            </a:r>
+            <a:endParaRPr lang="en-US" sz="2400" b="1" cap="none" spc="0" dirty="0">
+              <a:ln w="50800"/>
+              <a:solidFill>
+                <a:schemeClr val="bg1">
+                  <a:shade val="50000"/>
+                </a:schemeClr>
+              </a:solidFill>
+              <a:effectLst/>
+            </a:endParaRPr>
+          </a:p>
+        </p:txBody>
+      </p:sp>
+      <p:sp>
+        <p:nvSpPr>
+          <p:cNvPr id="16" name="Rectangle 15"/>
+          <p:cNvSpPr/>
+          <p:nvPr/>
+        </p:nvSpPr>
+        <p:spPr>
+          <a:xfrm>
+            <a:off x="6934200" y="4343400"/>
+            <a:ext cx="218919" cy="461665"/>
+          </a:xfrm>
+          <a:prstGeom prst="rect">
+            <a:avLst/>
+          </a:prstGeom>
+          <a:noFill/>
+        </p:spPr>
+        <p:txBody>
+          <a:bodyPr wrap="square" lIns="91440" tIns="45720" rIns="91440" bIns="45720">
+            <a:spAutoFit/>
+            <a:scene3d>
+              <a:camera prst="orthographicFront"/>
+              <a:lightRig rig="balanced" dir="t">
+                <a:rot lat="0" lon="0" rev="2100000"/>
+              </a:lightRig>
+            </a:scene3d>
+            <a:sp3d extrusionH="57150" prstMaterial="metal">
+              <a:bevelT w="38100" h="25400"/>
+              <a:contourClr>
+                <a:schemeClr val="bg2"/>
+              </a:contourClr>
+            </a:sp3d>
+          </a:bodyPr>
+          <a:lstStyle/>
+          <a:p>
+            <a:pPr algn="ctr"/>
+            <a:r>
+              <a:rPr lang="en-IN" sz="2400" b="1" dirty="0" smtClean="0">
+                <a:ln w="50800"/>
+                <a:solidFill>
+                  <a:schemeClr val="bg1">
+                    <a:shade val="50000"/>
+                  </a:schemeClr>
+                </a:solidFill>
+              </a:rPr>
+              <a:t>B</a:t>
+            </a:r>
+            <a:endParaRPr lang="en-US" sz="2400" b="1" cap="none" spc="0" dirty="0">
+              <a:ln w="50800"/>
+              <a:solidFill>
+                <a:schemeClr val="bg1">
+                  <a:shade val="50000"/>
+                </a:schemeClr>
+              </a:solidFill>
+              <a:effectLst/>
+            </a:endParaRPr>
+          </a:p>
+        </p:txBody>
+      </p:sp>
+      <p:sp>
+        <p:nvSpPr>
+          <p:cNvPr id="17" name="Rectangle 16"/>
+          <p:cNvSpPr/>
+          <p:nvPr/>
+        </p:nvSpPr>
+        <p:spPr>
+          <a:xfrm>
+            <a:off x="8342107" y="5869129"/>
+            <a:ext cx="218919" cy="461665"/>
+          </a:xfrm>
+          <a:prstGeom prst="rect">
+            <a:avLst/>
+          </a:prstGeom>
+          <a:noFill/>
+        </p:spPr>
+        <p:txBody>
+          <a:bodyPr wrap="square" lIns="91440" tIns="45720" rIns="91440" bIns="45720">
+            <a:spAutoFit/>
+            <a:scene3d>
+              <a:camera prst="orthographicFront"/>
+              <a:lightRig rig="balanced" dir="t">
+                <a:rot lat="0" lon="0" rev="2100000"/>
+              </a:lightRig>
+            </a:scene3d>
+            <a:sp3d extrusionH="57150" prstMaterial="metal">
+              <a:bevelT w="38100" h="25400"/>
+              <a:contourClr>
+                <a:schemeClr val="bg2"/>
+              </a:contourClr>
+            </a:sp3d>
+          </a:bodyPr>
+          <a:lstStyle/>
+          <a:p>
+            <a:pPr algn="ctr"/>
+            <a:r>
+              <a:rPr lang="en-IN" sz="2400" b="1" dirty="0" smtClean="0">
+                <a:ln w="50800"/>
+                <a:solidFill>
+                  <a:schemeClr val="bg1">
+                    <a:shade val="50000"/>
+                  </a:schemeClr>
+                </a:solidFill>
+              </a:rPr>
+              <a:t>C</a:t>
+            </a:r>
+            <a:endParaRPr lang="en-US" sz="2400" b="1" cap="none" spc="0" dirty="0">
+              <a:ln w="50800"/>
+              <a:solidFill>
+                <a:schemeClr val="bg1">
+                  <a:shade val="50000"/>
+                </a:schemeClr>
+              </a:solidFill>
+              <a:effectLst/>
+            </a:endParaRPr>
           </a:p>
         </p:txBody>
       </p:sp>
@@ -5040,9 +5692,9 @@
                                           </p:stCondLst>
                                         </p:cTn>
                                         <p:tgtEl>
-                                          <p:spTgt spid="3">
+                                          <p:spTgt spid="6">
                                             <p:txEl>
-                                              <p:pRg st="4" end="4"/>
+                                              <p:pRg st="0" end="0"/>
                                             </p:txEl>
                                           </p:spTgt>
                                         </p:tgtEl>
@@ -5058,9 +5710,9 @@
                                       <p:cBhvr>
                                         <p:cTn id="21" dur="500"/>
                                         <p:tgtEl>
-                                          <p:spTgt spid="3">
+                                          <p:spTgt spid="6">
                                             <p:txEl>
-                                              <p:pRg st="4" end="4"/>
+                                              <p:pRg st="0" end="0"/>
                                             </p:txEl>
                                           </p:spTgt>
                                         </p:tgtEl>
@@ -5083,9 +5735,9 @@
                                           </p:stCondLst>
                                         </p:cTn>
                                         <p:tgtEl>
-                                          <p:spTgt spid="3">
+                                          <p:spTgt spid="6">
                                             <p:txEl>
-                                              <p:pRg st="5" end="5"/>
+                                              <p:pRg st="1" end="1"/>
                                             </p:txEl>
                                           </p:spTgt>
                                         </p:tgtEl>
@@ -5101,9 +5753,9 @@
                                       <p:cBhvr>
                                         <p:cTn id="24" dur="500"/>
                                         <p:tgtEl>
-                                          <p:spTgt spid="3">
+                                          <p:spTgt spid="6">
                                             <p:txEl>
-                                              <p:pRg st="5" end="5"/>
+                                              <p:pRg st="1" end="1"/>
                                             </p:txEl>
                                           </p:spTgt>
                                         </p:tgtEl>
@@ -5126,9 +5778,9 @@
                                           </p:stCondLst>
                                         </p:cTn>
                                         <p:tgtEl>
-                                          <p:spTgt spid="3">
+                                          <p:spTgt spid="6">
                                             <p:txEl>
-                                              <p:pRg st="6" end="6"/>
+                                              <p:pRg st="2" end="2"/>
                                             </p:txEl>
                                           </p:spTgt>
                                         </p:tgtEl>
@@ -5144,52 +5796,9 @@
                                       <p:cBhvr>
                                         <p:cTn id="27" dur="500"/>
                                         <p:tgtEl>
-                                          <p:spTgt spid="3">
+                                          <p:spTgt spid="6">
                                             <p:txEl>
-                                              <p:pRg st="6" end="6"/>
-                                            </p:txEl>
-                                          </p:spTgt>
-                                        </p:tgtEl>
-                                      </p:cBhvr>
-                                    </p:animEffect>
-                                  </p:childTnLst>
-                                </p:cTn>
-                              </p:par>
-                              <p:par>
-                                <p:cTn id="28" presetID="10" presetClass="entr" presetSubtype="0" fill="hold" grpId="0" nodeType="withEffect">
-                                  <p:stCondLst>
-                                    <p:cond delay="0"/>
-                                  </p:stCondLst>
-                                  <p:childTnLst>
-                                    <p:set>
-                                      <p:cBhvr>
-                                        <p:cTn id="29" dur="1" fill="hold">
-                                          <p:stCondLst>
-                                            <p:cond delay="0"/>
-                                          </p:stCondLst>
-                                        </p:cTn>
-                                        <p:tgtEl>
-                                          <p:spTgt spid="3">
-                                            <p:txEl>
-                                              <p:pRg st="7" end="7"/>
-                                            </p:txEl>
-                                          </p:spTgt>
-                                        </p:tgtEl>
-                                        <p:attrNameLst>
-                                          <p:attrName>style.visibility</p:attrName>
-                                        </p:attrNameLst>
-                                      </p:cBhvr>
-                                      <p:to>
-                                        <p:strVal val="visible"/>
-                                      </p:to>
-                                    </p:set>
-                                    <p:animEffect transition="in" filter="fade">
-                                      <p:cBhvr>
-                                        <p:cTn id="30" dur="500"/>
-                                        <p:tgtEl>
-                                          <p:spTgt spid="3">
-                                            <p:txEl>
-                                              <p:pRg st="7" end="7"/>
+                                              <p:pRg st="2" end="2"/>
                                             </p:txEl>
                                           </p:spTgt>
                                         </p:tgtEl>
@@ -5227,13 +5836,14 @@
     </p:tnLst>
     <p:bldLst>
       <p:bldP spid="3" grpId="0" build="p"/>
+      <p:bldP spid="6" grpId="0" build="p"/>
     </p:bldLst>
   </p:timing>
 </p:sld>
 </file>
 
 <file path=ppt/slides/slide12.xml><?xml version="1.0" encoding="utf-8"?>
-<p:sld xmlns:a="http://schemas.openxmlformats.org/drawingml/2006/main" xmlns:r="http://schemas.openxmlformats.org/officeDocument/2006/relationships" xmlns:p="http://schemas.openxmlformats.org/presentationml/2006/main">
+<p:sld xmlns:a="http://schemas.openxmlformats.org/drawingml/2006/main" xmlns:r="http://schemas.openxmlformats.org/officeDocument/2006/relationships" xmlns:p="http://schemas.openxmlformats.org/presentationml/2006/main" showMasterSp="0">
   <p:cSld>
     <p:spTree>
       <p:nvGrpSpPr>
@@ -5251,39 +5861,813 @@
       </p:grpSpPr>
       <p:sp>
         <p:nvSpPr>
-          <p:cNvPr id="2" name="Content Placeholder 1"/>
-          <p:cNvSpPr>
+          <p:cNvPr id="4" name="Content Placeholder 2"/>
+          <p:cNvSpPr txBox="1">
             <a:spLocks noGrp="1"/>
           </p:cNvSpPr>
           <p:nvPr>
             <p:ph idx="1"/>
           </p:nvPr>
         </p:nvSpPr>
-        <p:spPr/>
+        <p:spPr>
+          <a:xfrm>
+            <a:off x="304800" y="381000"/>
+            <a:ext cx="5472953" cy="3877815"/>
+          </a:xfrm>
+          <a:prstGeom prst="rect">
+            <a:avLst/>
+          </a:prstGeom>
+        </p:spPr>
         <p:txBody>
-          <a:bodyPr/>
+          <a:bodyPr vert="horz" lIns="91440" tIns="45720" rIns="91440" bIns="45720" rtlCol="0">
+            <a:normAutofit/>
+          </a:bodyPr>
+          <a:lstStyle>
+            <a:lvl1pPr marL="365760" indent="-365760" algn="l" defTabSz="914400" rtl="0" eaLnBrk="1" latinLnBrk="0" hangingPunct="1">
+              <a:spcBef>
+                <a:spcPct val="20000"/>
+              </a:spcBef>
+              <a:buClr>
+                <a:schemeClr val="accent1"/>
+              </a:buClr>
+              <a:buFont typeface="Wingdings" pitchFamily="2" charset="2"/>
+              <a:buChar char=""/>
+              <a:defRPr sz="2400" kern="1200">
+                <a:solidFill>
+                  <a:schemeClr val="tx1">
+                    <a:lumMod val="85000"/>
+                    <a:lumOff val="15000"/>
+                  </a:schemeClr>
+                </a:solidFill>
+                <a:latin typeface="+mn-lt"/>
+                <a:ea typeface="+mn-ea"/>
+                <a:cs typeface="+mn-cs"/>
+              </a:defRPr>
+            </a:lvl1pPr>
+            <a:lvl2pPr marL="777240" indent="-365760" algn="l" defTabSz="914400" rtl="0" eaLnBrk="1" latinLnBrk="0" hangingPunct="1">
+              <a:spcBef>
+                <a:spcPct val="20000"/>
+              </a:spcBef>
+              <a:buClr>
+                <a:schemeClr val="accent1"/>
+              </a:buClr>
+              <a:buFont typeface="Wingdings" pitchFamily="2" charset="2"/>
+              <a:buChar char=""/>
+              <a:defRPr sz="2200" kern="1200">
+                <a:solidFill>
+                  <a:schemeClr val="tx1">
+                    <a:lumMod val="85000"/>
+                    <a:lumOff val="15000"/>
+                  </a:schemeClr>
+                </a:solidFill>
+                <a:latin typeface="+mn-lt"/>
+                <a:ea typeface="+mn-ea"/>
+                <a:cs typeface="+mn-cs"/>
+              </a:defRPr>
+            </a:lvl2pPr>
+            <a:lvl3pPr marL="1143000" indent="-365760" algn="l" defTabSz="914400" rtl="0" eaLnBrk="1" latinLnBrk="0" hangingPunct="1">
+              <a:spcBef>
+                <a:spcPct val="20000"/>
+              </a:spcBef>
+              <a:buClr>
+                <a:schemeClr val="accent1"/>
+              </a:buClr>
+              <a:buFont typeface="Wingdings" pitchFamily="2" charset="2"/>
+              <a:buChar char=""/>
+              <a:defRPr sz="2000" kern="1200">
+                <a:solidFill>
+                  <a:schemeClr val="tx1">
+                    <a:lumMod val="85000"/>
+                    <a:lumOff val="15000"/>
+                  </a:schemeClr>
+                </a:solidFill>
+                <a:latin typeface="+mn-lt"/>
+                <a:ea typeface="+mn-ea"/>
+                <a:cs typeface="+mn-cs"/>
+              </a:defRPr>
+            </a:lvl3pPr>
+            <a:lvl4pPr marL="1508760" indent="-320040" algn="l" defTabSz="914400" rtl="0" eaLnBrk="1" latinLnBrk="0" hangingPunct="1">
+              <a:spcBef>
+                <a:spcPct val="20000"/>
+              </a:spcBef>
+              <a:buClr>
+                <a:schemeClr val="accent1"/>
+              </a:buClr>
+              <a:buFont typeface="Wingdings" pitchFamily="2" charset="2"/>
+              <a:buChar char=""/>
+              <a:defRPr sz="1800" kern="1200">
+                <a:solidFill>
+                  <a:schemeClr val="tx1">
+                    <a:lumMod val="85000"/>
+                    <a:lumOff val="15000"/>
+                  </a:schemeClr>
+                </a:solidFill>
+                <a:latin typeface="+mn-lt"/>
+                <a:ea typeface="+mn-ea"/>
+                <a:cs typeface="+mn-cs"/>
+              </a:defRPr>
+            </a:lvl4pPr>
+            <a:lvl5pPr marL="1828800" indent="-320040" algn="l" defTabSz="914400" rtl="0" eaLnBrk="1" latinLnBrk="0" hangingPunct="1">
+              <a:spcBef>
+                <a:spcPct val="20000"/>
+              </a:spcBef>
+              <a:buClr>
+                <a:schemeClr val="accent1"/>
+              </a:buClr>
+              <a:buFont typeface="Wingdings" pitchFamily="2" charset="2"/>
+              <a:buChar char=""/>
+              <a:defRPr sz="1600" kern="1200">
+                <a:solidFill>
+                  <a:schemeClr val="tx1">
+                    <a:lumMod val="85000"/>
+                    <a:lumOff val="15000"/>
+                  </a:schemeClr>
+                </a:solidFill>
+                <a:latin typeface="+mn-lt"/>
+                <a:ea typeface="+mn-ea"/>
+                <a:cs typeface="+mn-cs"/>
+              </a:defRPr>
+            </a:lvl5pPr>
+            <a:lvl6pPr marL="2148840" indent="-274320" algn="l" defTabSz="914400" rtl="0" eaLnBrk="1" latinLnBrk="0" hangingPunct="1">
+              <a:spcBef>
+                <a:spcPts val="400"/>
+              </a:spcBef>
+              <a:buClr>
+                <a:schemeClr val="accent1"/>
+              </a:buClr>
+              <a:buFont typeface="Wingdings" pitchFamily="2" charset="2"/>
+              <a:buChar char=""/>
+              <a:defRPr sz="1400" kern="1200">
+                <a:solidFill>
+                  <a:schemeClr val="tx1"/>
+                </a:solidFill>
+                <a:latin typeface="+mn-lt"/>
+                <a:ea typeface="+mn-ea"/>
+                <a:cs typeface="+mn-cs"/>
+              </a:defRPr>
+            </a:lvl6pPr>
+            <a:lvl7pPr marL="2468880" indent="-274320" algn="l" defTabSz="914400" rtl="0" eaLnBrk="1" latinLnBrk="0" hangingPunct="1">
+              <a:spcBef>
+                <a:spcPts val="400"/>
+              </a:spcBef>
+              <a:buClr>
+                <a:schemeClr val="accent1"/>
+              </a:buClr>
+              <a:buFont typeface="Wingdings" pitchFamily="2" charset="2"/>
+              <a:buChar char=""/>
+              <a:defRPr sz="1400" kern="1200">
+                <a:solidFill>
+                  <a:schemeClr val="tx1"/>
+                </a:solidFill>
+                <a:latin typeface="+mn-lt"/>
+                <a:ea typeface="+mn-ea"/>
+                <a:cs typeface="+mn-cs"/>
+              </a:defRPr>
+            </a:lvl7pPr>
+            <a:lvl8pPr marL="2788920" indent="-274320" algn="l" defTabSz="914400" rtl="0" eaLnBrk="1" latinLnBrk="0" hangingPunct="1">
+              <a:spcBef>
+                <a:spcPts val="400"/>
+              </a:spcBef>
+              <a:buClr>
+                <a:schemeClr val="accent1"/>
+              </a:buClr>
+              <a:buFont typeface="Wingdings" pitchFamily="2" charset="2"/>
+              <a:buChar char=""/>
+              <a:defRPr sz="1400" kern="1200">
+                <a:solidFill>
+                  <a:schemeClr val="tx1"/>
+                </a:solidFill>
+                <a:latin typeface="+mn-lt"/>
+                <a:ea typeface="+mn-ea"/>
+                <a:cs typeface="+mn-cs"/>
+              </a:defRPr>
+            </a:lvl8pPr>
+            <a:lvl9pPr marL="3108960" indent="-274320" algn="l" defTabSz="914400" rtl="0" eaLnBrk="1" latinLnBrk="0" hangingPunct="1">
+              <a:spcBef>
+                <a:spcPts val="400"/>
+              </a:spcBef>
+              <a:buClr>
+                <a:schemeClr val="accent1"/>
+              </a:buClr>
+              <a:buFont typeface="Wingdings" pitchFamily="2" charset="2"/>
+              <a:buChar char=""/>
+              <a:defRPr sz="1400" kern="1200">
+                <a:solidFill>
+                  <a:schemeClr val="tx1"/>
+                </a:solidFill>
+                <a:latin typeface="+mn-lt"/>
+                <a:ea typeface="+mn-ea"/>
+                <a:cs typeface="+mn-cs"/>
+              </a:defRPr>
+            </a:lvl9pPr>
+          </a:lstStyle>
+          <a:p>
+            <a:r>
+              <a:rPr lang="en-US" b="1" u="sng" dirty="0" smtClean="0"/>
+              <a:t>MOVEMENT </a:t>
+            </a:r>
+            <a:r>
+              <a:rPr lang="en-US" b="1" u="sng" dirty="0"/>
+              <a:t>OF THE </a:t>
+            </a:r>
+            <a:r>
+              <a:rPr lang="en-US" b="1" u="sng" dirty="0" smtClean="0"/>
+              <a:t>KNIGHT: </a:t>
+            </a:r>
+            <a:endParaRPr lang="en-US" b="1" u="sng" dirty="0"/>
+          </a:p>
+          <a:p>
+            <a:pPr lvl="1">
+              <a:buFont typeface="Wingdings" panose="05000000000000000000" pitchFamily="2" charset="2"/>
+              <a:buChar char="ü"/>
+            </a:pPr>
+            <a:r>
+              <a:rPr lang="en-US" dirty="0"/>
+              <a:t>The </a:t>
+            </a:r>
+            <a:r>
+              <a:rPr lang="en-US" dirty="0" smtClean="0"/>
+              <a:t>knight move must be first 2 forward moves and then 1 side move only but not 1 forward and 2 sideways as in move C.</a:t>
+            </a:r>
+          </a:p>
+          <a:p>
+            <a:pPr lvl="1">
+              <a:buFont typeface="Wingdings" panose="05000000000000000000" pitchFamily="2" charset="2"/>
+              <a:buChar char="ü"/>
+            </a:pPr>
+            <a:r>
+              <a:rPr lang="en-IN" dirty="0" smtClean="0"/>
+              <a:t>During this movement if it comes across only one wall as in move A, it is a valid move.</a:t>
+            </a:r>
+          </a:p>
+          <a:p>
+            <a:pPr lvl="1">
+              <a:buFont typeface="Wingdings" panose="05000000000000000000" pitchFamily="2" charset="2"/>
+              <a:buChar char="ü"/>
+            </a:pPr>
+            <a:r>
+              <a:rPr lang="en-IN" dirty="0" smtClean="0"/>
+              <a:t>If the it comes across more than 1 wall as in move B, it is invalid.</a:t>
+            </a:r>
+            <a:endParaRPr lang="en-US" dirty="0" smtClean="0"/>
+          </a:p>
+        </p:txBody>
+      </p:sp>
+      <p:pic>
+        <p:nvPicPr>
+          <p:cNvPr id="9" name="Picture 2"/>
+          <p:cNvPicPr>
+            <a:picLocks noChangeAspect="1" noChangeArrowheads="1"/>
+          </p:cNvPicPr>
+          <p:nvPr/>
+        </p:nvPicPr>
+        <p:blipFill>
+          <a:blip r:embed="rId2">
+            <a:extLst>
+              <a:ext uri="{28A0092B-C50C-407E-A947-70E740481C1C}">
+                <a14:useLocalDpi xmlns:a14="http://schemas.microsoft.com/office/drawing/2010/main" val="0"/>
+              </a:ext>
+            </a:extLst>
+          </a:blip>
+          <a:srcRect/>
+          <a:stretch>
+            <a:fillRect/>
+          </a:stretch>
+        </p:blipFill>
+        <p:spPr bwMode="auto">
+          <a:xfrm>
+            <a:off x="6309360" y="2173224"/>
+            <a:ext cx="2072640" cy="1554480"/>
+          </a:xfrm>
+          <a:prstGeom prst="rect">
+            <a:avLst/>
+          </a:prstGeom>
+          <a:noFill/>
+          <a:ln>
+            <a:noFill/>
+          </a:ln>
+          <a:extLst>
+            <a:ext uri="{909E8E84-426E-40DD-AFC4-6F175D3DCCD1}">
+              <a14:hiddenFill xmlns:a14="http://schemas.microsoft.com/office/drawing/2010/main">
+                <a:solidFill>
+                  <a:schemeClr val="accent1"/>
+                </a:solidFill>
+              </a14:hiddenFill>
+            </a:ext>
+            <a:ext uri="{91240B29-F687-4F45-9708-019B960494DF}">
+              <a14:hiddenLine xmlns:a14="http://schemas.microsoft.com/office/drawing/2010/main" w="9525">
+                <a:solidFill>
+                  <a:schemeClr val="tx1"/>
+                </a:solidFill>
+                <a:miter lim="800000"/>
+                <a:headEnd/>
+                <a:tailEnd/>
+              </a14:hiddenLine>
+            </a:ext>
+          </a:extLst>
+        </p:spPr>
+      </p:pic>
+      <p:pic>
+        <p:nvPicPr>
+          <p:cNvPr id="2052" name="Picture 4"/>
+          <p:cNvPicPr>
+            <a:picLocks noChangeAspect="1" noChangeArrowheads="1"/>
+          </p:cNvPicPr>
+          <p:nvPr/>
+        </p:nvPicPr>
+        <p:blipFill rotWithShape="1">
+          <a:blip r:embed="rId3">
+            <a:extLst>
+              <a:ext uri="{28A0092B-C50C-407E-A947-70E740481C1C}">
+                <a14:useLocalDpi xmlns:a14="http://schemas.microsoft.com/office/drawing/2010/main" val="0"/>
+              </a:ext>
+            </a:extLst>
+          </a:blip>
+          <a:srcRect t="10492" b="3108"/>
+          <a:stretch/>
+        </p:blipFill>
+        <p:spPr bwMode="auto">
+          <a:xfrm>
+            <a:off x="6294497" y="362712"/>
+            <a:ext cx="2059679" cy="1542288"/>
+          </a:xfrm>
+          <a:prstGeom prst="rect">
+            <a:avLst/>
+          </a:prstGeom>
+          <a:noFill/>
+          <a:ln>
+            <a:noFill/>
+          </a:ln>
+          <a:extLst>
+            <a:ext uri="{909E8E84-426E-40DD-AFC4-6F175D3DCCD1}">
+              <a14:hiddenFill xmlns:a14="http://schemas.microsoft.com/office/drawing/2010/main">
+                <a:solidFill>
+                  <a:schemeClr val="accent1"/>
+                </a:solidFill>
+              </a14:hiddenFill>
+            </a:ext>
+            <a:ext uri="{91240B29-F687-4F45-9708-019B960494DF}">
+              <a14:hiddenLine xmlns:a14="http://schemas.microsoft.com/office/drawing/2010/main" w="9525">
+                <a:solidFill>
+                  <a:schemeClr val="tx1"/>
+                </a:solidFill>
+                <a:miter lim="800000"/>
+                <a:headEnd/>
+                <a:tailEnd/>
+              </a14:hiddenLine>
+            </a:ext>
+          </a:extLst>
+        </p:spPr>
+      </p:pic>
+      <p:sp>
+        <p:nvSpPr>
+          <p:cNvPr id="11" name="Bent-Up Arrow 10"/>
+          <p:cNvSpPr/>
+          <p:nvPr/>
+        </p:nvSpPr>
+        <p:spPr>
+          <a:xfrm>
+            <a:off x="7086600" y="685800"/>
+            <a:ext cx="1143000" cy="448056"/>
+          </a:xfrm>
+          <a:prstGeom prst="bentUpArrow">
+            <a:avLst>
+              <a:gd name="adj1" fmla="val 8673"/>
+              <a:gd name="adj2" fmla="val 26020"/>
+              <a:gd name="adj3" fmla="val 27041"/>
+            </a:avLst>
+          </a:prstGeom>
+          <a:solidFill>
+            <a:srgbClr val="00B050"/>
+          </a:solidFill>
+        </p:spPr>
+        <p:style>
+          <a:lnRef idx="2">
+            <a:schemeClr val="accent1">
+              <a:shade val="50000"/>
+            </a:schemeClr>
+          </a:lnRef>
+          <a:fillRef idx="1">
+            <a:schemeClr val="accent1"/>
+          </a:fillRef>
+          <a:effectRef idx="0">
+            <a:schemeClr val="accent1"/>
+          </a:effectRef>
+          <a:fontRef idx="minor">
+            <a:schemeClr val="lt1"/>
+          </a:fontRef>
+        </p:style>
+        <p:txBody>
+          <a:bodyPr rtlCol="0" anchor="ctr"/>
           <a:lstStyle/>
           <a:p>
+            <a:pPr algn="ctr"/>
             <a:endParaRPr lang="en-US"/>
           </a:p>
         </p:txBody>
       </p:sp>
       <p:sp>
         <p:nvSpPr>
-          <p:cNvPr id="3" name="Title 2"/>
-          <p:cNvSpPr>
-            <a:spLocks noGrp="1"/>
-          </p:cNvSpPr>
-          <p:nvPr>
-            <p:ph type="title"/>
-          </p:nvPr>
+          <p:cNvPr id="15" name="Bent-Up Arrow 14"/>
+          <p:cNvSpPr/>
+          <p:nvPr/>
         </p:nvSpPr>
-        <p:spPr/>
+        <p:spPr>
+          <a:xfrm rot="10800000">
+            <a:off x="6400800" y="2941320"/>
+            <a:ext cx="1143000" cy="448056"/>
+          </a:xfrm>
+          <a:prstGeom prst="bentUpArrow">
+            <a:avLst>
+              <a:gd name="adj1" fmla="val 8673"/>
+              <a:gd name="adj2" fmla="val 26020"/>
+              <a:gd name="adj3" fmla="val 27041"/>
+            </a:avLst>
+          </a:prstGeom>
+          <a:solidFill>
+            <a:schemeClr val="bg1"/>
+          </a:solidFill>
+        </p:spPr>
+        <p:style>
+          <a:lnRef idx="2">
+            <a:schemeClr val="accent1">
+              <a:shade val="50000"/>
+            </a:schemeClr>
+          </a:lnRef>
+          <a:fillRef idx="1">
+            <a:schemeClr val="accent1"/>
+          </a:fillRef>
+          <a:effectRef idx="0">
+            <a:schemeClr val="accent1"/>
+          </a:effectRef>
+          <a:fontRef idx="minor">
+            <a:schemeClr val="lt1"/>
+          </a:fontRef>
+        </p:style>
         <p:txBody>
-          <a:bodyPr/>
+          <a:bodyPr rtlCol="0" anchor="ctr"/>
           <a:lstStyle/>
           <a:p>
-            <a:endParaRPr lang="en-US"/>
+            <a:pPr algn="ctr"/>
+            <a:endParaRPr lang="en-US" dirty="0"/>
+          </a:p>
+        </p:txBody>
+      </p:sp>
+      <p:sp>
+        <p:nvSpPr>
+          <p:cNvPr id="16" name="Bent-Up Arrow 15"/>
+          <p:cNvSpPr/>
+          <p:nvPr/>
+        </p:nvSpPr>
+        <p:spPr>
+          <a:xfrm rot="5400000" flipV="1">
+            <a:off x="6830949" y="2826639"/>
+            <a:ext cx="509778" cy="1068325"/>
+          </a:xfrm>
+          <a:prstGeom prst="bentUpArrow">
+            <a:avLst>
+              <a:gd name="adj1" fmla="val 8673"/>
+              <a:gd name="adj2" fmla="val 26020"/>
+              <a:gd name="adj3" fmla="val 27041"/>
+            </a:avLst>
+          </a:prstGeom>
+          <a:solidFill>
+            <a:schemeClr val="bg1"/>
+          </a:solidFill>
+        </p:spPr>
+        <p:style>
+          <a:lnRef idx="2">
+            <a:schemeClr val="accent1">
+              <a:shade val="50000"/>
+            </a:schemeClr>
+          </a:lnRef>
+          <a:fillRef idx="1">
+            <a:schemeClr val="accent1"/>
+          </a:fillRef>
+          <a:effectRef idx="0">
+            <a:schemeClr val="accent1"/>
+          </a:effectRef>
+          <a:fontRef idx="minor">
+            <a:schemeClr val="lt1"/>
+          </a:fontRef>
+        </p:style>
+        <p:txBody>
+          <a:bodyPr rtlCol="0" anchor="ctr"/>
+          <a:lstStyle/>
+          <a:p>
+            <a:pPr algn="ctr"/>
+            <a:endParaRPr lang="en-US" dirty="0"/>
+          </a:p>
+        </p:txBody>
+      </p:sp>
+      <p:sp>
+        <p:nvSpPr>
+          <p:cNvPr id="17" name="Multiply 16"/>
+          <p:cNvSpPr/>
+          <p:nvPr/>
+        </p:nvSpPr>
+        <p:spPr>
+          <a:xfrm rot="20705000">
+            <a:off x="6473766" y="2759963"/>
+            <a:ext cx="457201" cy="381000"/>
+          </a:xfrm>
+          <a:prstGeom prst="mathMultiply">
+            <a:avLst>
+              <a:gd name="adj1" fmla="val 9120"/>
+            </a:avLst>
+          </a:prstGeom>
+          <a:solidFill>
+            <a:srgbClr val="FF0000"/>
+          </a:solidFill>
+        </p:spPr>
+        <p:style>
+          <a:lnRef idx="2">
+            <a:schemeClr val="accent1">
+              <a:shade val="50000"/>
+            </a:schemeClr>
+          </a:lnRef>
+          <a:fillRef idx="1">
+            <a:schemeClr val="accent1"/>
+          </a:fillRef>
+          <a:effectRef idx="0">
+            <a:schemeClr val="accent1"/>
+          </a:effectRef>
+          <a:fontRef idx="minor">
+            <a:schemeClr val="lt1"/>
+          </a:fontRef>
+        </p:style>
+        <p:txBody>
+          <a:bodyPr rtlCol="0" anchor="ctr"/>
+          <a:lstStyle/>
+          <a:p>
+            <a:pPr algn="ctr"/>
+            <a:endParaRPr lang="en-US" dirty="0" smtClean="0">
+              <a:ln>
+                <a:solidFill>
+                  <a:srgbClr val="FF0000"/>
+                </a:solidFill>
+              </a:ln>
+              <a:solidFill>
+                <a:srgbClr val="FF0000"/>
+              </a:solidFill>
+            </a:endParaRPr>
+          </a:p>
+          <a:p>
+            <a:pPr algn="ctr"/>
+            <a:endParaRPr lang="en-US" dirty="0">
+              <a:ln>
+                <a:solidFill>
+                  <a:srgbClr val="FF0000"/>
+                </a:solidFill>
+              </a:ln>
+              <a:solidFill>
+                <a:srgbClr val="FF0000"/>
+              </a:solidFill>
+            </a:endParaRPr>
+          </a:p>
+        </p:txBody>
+      </p:sp>
+      <p:sp>
+        <p:nvSpPr>
+          <p:cNvPr id="18" name="Multiply 17"/>
+          <p:cNvSpPr/>
+          <p:nvPr/>
+        </p:nvSpPr>
+        <p:spPr>
+          <a:xfrm rot="20705000">
+            <a:off x="6899333" y="3294279"/>
+            <a:ext cx="457201" cy="381000"/>
+          </a:xfrm>
+          <a:prstGeom prst="mathMultiply">
+            <a:avLst>
+              <a:gd name="adj1" fmla="val 9120"/>
+            </a:avLst>
+          </a:prstGeom>
+          <a:solidFill>
+            <a:srgbClr val="FF0000"/>
+          </a:solidFill>
+        </p:spPr>
+        <p:style>
+          <a:lnRef idx="2">
+            <a:schemeClr val="accent1">
+              <a:shade val="50000"/>
+            </a:schemeClr>
+          </a:lnRef>
+          <a:fillRef idx="1">
+            <a:schemeClr val="accent1"/>
+          </a:fillRef>
+          <a:effectRef idx="0">
+            <a:schemeClr val="accent1"/>
+          </a:effectRef>
+          <a:fontRef idx="minor">
+            <a:schemeClr val="lt1"/>
+          </a:fontRef>
+        </p:style>
+        <p:txBody>
+          <a:bodyPr rtlCol="0" anchor="ctr"/>
+          <a:lstStyle/>
+          <a:p>
+            <a:pPr algn="ctr"/>
+            <a:endParaRPr lang="en-US" dirty="0" smtClean="0">
+              <a:ln>
+                <a:solidFill>
+                  <a:srgbClr val="FF0000"/>
+                </a:solidFill>
+              </a:ln>
+              <a:solidFill>
+                <a:srgbClr val="FF0000"/>
+              </a:solidFill>
+            </a:endParaRPr>
+          </a:p>
+          <a:p>
+            <a:pPr algn="ctr"/>
+            <a:endParaRPr lang="en-US" dirty="0">
+              <a:ln>
+                <a:solidFill>
+                  <a:srgbClr val="FF0000"/>
+                </a:solidFill>
+              </a:ln>
+              <a:solidFill>
+                <a:srgbClr val="FF0000"/>
+              </a:solidFill>
+            </a:endParaRPr>
+          </a:p>
+        </p:txBody>
+      </p:sp>
+      <p:sp>
+        <p:nvSpPr>
+          <p:cNvPr id="19" name="Rectangle 18"/>
+          <p:cNvSpPr/>
+          <p:nvPr/>
+        </p:nvSpPr>
+        <p:spPr>
+          <a:xfrm>
+            <a:off x="8010681" y="300335"/>
+            <a:ext cx="218919" cy="461665"/>
+          </a:xfrm>
+          <a:prstGeom prst="rect">
+            <a:avLst/>
+          </a:prstGeom>
+          <a:noFill/>
+        </p:spPr>
+        <p:txBody>
+          <a:bodyPr wrap="square" lIns="91440" tIns="45720" rIns="91440" bIns="45720">
+            <a:spAutoFit/>
+            <a:scene3d>
+              <a:camera prst="orthographicFront"/>
+              <a:lightRig rig="balanced" dir="t">
+                <a:rot lat="0" lon="0" rev="2100000"/>
+              </a:lightRig>
+            </a:scene3d>
+            <a:sp3d extrusionH="57150" prstMaterial="metal">
+              <a:bevelT w="38100" h="25400"/>
+              <a:contourClr>
+                <a:schemeClr val="bg2"/>
+              </a:contourClr>
+            </a:sp3d>
+          </a:bodyPr>
+          <a:lstStyle/>
+          <a:p>
+            <a:pPr algn="ctr"/>
+            <a:r>
+              <a:rPr lang="en-US" sz="2400" b="1" cap="none" spc="0" dirty="0" smtClean="0">
+                <a:ln w="50800"/>
+                <a:solidFill>
+                  <a:schemeClr val="bg1">
+                    <a:shade val="50000"/>
+                  </a:schemeClr>
+                </a:solidFill>
+                <a:effectLst/>
+              </a:rPr>
+              <a:t>A</a:t>
+            </a:r>
+            <a:endParaRPr lang="en-US" sz="2400" b="1" cap="none" spc="0" dirty="0">
+              <a:ln w="50800"/>
+              <a:solidFill>
+                <a:schemeClr val="bg1">
+                  <a:shade val="50000"/>
+                </a:schemeClr>
+              </a:solidFill>
+              <a:effectLst/>
+            </a:endParaRPr>
+          </a:p>
+        </p:txBody>
+      </p:sp>
+      <p:sp>
+        <p:nvSpPr>
+          <p:cNvPr id="20" name="Rectangle 19"/>
+          <p:cNvSpPr/>
+          <p:nvPr/>
+        </p:nvSpPr>
+        <p:spPr>
+          <a:xfrm>
+            <a:off x="6530339" y="2362200"/>
+            <a:ext cx="218919" cy="461665"/>
+          </a:xfrm>
+          <a:prstGeom prst="rect">
+            <a:avLst/>
+          </a:prstGeom>
+          <a:noFill/>
+        </p:spPr>
+        <p:txBody>
+          <a:bodyPr wrap="square" lIns="91440" tIns="45720" rIns="91440" bIns="45720">
+            <a:spAutoFit/>
+            <a:scene3d>
+              <a:camera prst="orthographicFront"/>
+              <a:lightRig rig="balanced" dir="t">
+                <a:rot lat="0" lon="0" rev="2100000"/>
+              </a:lightRig>
+            </a:scene3d>
+            <a:sp3d extrusionH="57150" prstMaterial="metal">
+              <a:bevelT w="38100" h="25400"/>
+              <a:contourClr>
+                <a:schemeClr val="bg2"/>
+              </a:contourClr>
+            </a:sp3d>
+          </a:bodyPr>
+          <a:lstStyle/>
+          <a:p>
+            <a:pPr algn="ctr"/>
+            <a:r>
+              <a:rPr lang="en-US" sz="2400" b="1" cap="none" spc="0" dirty="0" smtClean="0">
+                <a:ln w="50800"/>
+                <a:solidFill>
+                  <a:schemeClr val="bg1">
+                    <a:shade val="50000"/>
+                  </a:schemeClr>
+                </a:solidFill>
+                <a:effectLst/>
+              </a:rPr>
+              <a:t>B</a:t>
+            </a:r>
+            <a:endParaRPr lang="en-US" sz="2400" b="1" cap="none" spc="0" dirty="0">
+              <a:ln w="50800"/>
+              <a:solidFill>
+                <a:schemeClr val="bg1">
+                  <a:shade val="50000"/>
+                </a:schemeClr>
+              </a:solidFill>
+              <a:effectLst/>
+            </a:endParaRPr>
+          </a:p>
+        </p:txBody>
+      </p:sp>
+      <p:sp>
+        <p:nvSpPr>
+          <p:cNvPr id="21" name="Rectangle 20"/>
+          <p:cNvSpPr/>
+          <p:nvPr/>
+        </p:nvSpPr>
+        <p:spPr>
+          <a:xfrm>
+            <a:off x="7620001" y="3241853"/>
+            <a:ext cx="218919" cy="461665"/>
+          </a:xfrm>
+          <a:prstGeom prst="rect">
+            <a:avLst/>
+          </a:prstGeom>
+          <a:noFill/>
+        </p:spPr>
+        <p:txBody>
+          <a:bodyPr wrap="square" lIns="91440" tIns="45720" rIns="91440" bIns="45720">
+            <a:spAutoFit/>
+            <a:scene3d>
+              <a:camera prst="orthographicFront"/>
+              <a:lightRig rig="balanced" dir="t">
+                <a:rot lat="0" lon="0" rev="2100000"/>
+              </a:lightRig>
+            </a:scene3d>
+            <a:sp3d extrusionH="57150" prstMaterial="metal">
+              <a:bevelT w="38100" h="25400"/>
+              <a:contourClr>
+                <a:schemeClr val="bg2"/>
+              </a:contourClr>
+            </a:sp3d>
+          </a:bodyPr>
+          <a:lstStyle/>
+          <a:p>
+            <a:pPr algn="ctr"/>
+            <a:r>
+              <a:rPr lang="en-US" sz="2400" b="1" cap="none" spc="0" dirty="0" smtClean="0">
+                <a:ln w="50800"/>
+                <a:solidFill>
+                  <a:schemeClr val="bg1">
+                    <a:shade val="50000"/>
+                  </a:schemeClr>
+                </a:solidFill>
+                <a:effectLst/>
+              </a:rPr>
+              <a:t>C</a:t>
+            </a:r>
+            <a:endParaRPr lang="en-US" sz="2400" b="1" cap="none" spc="0" dirty="0">
+              <a:ln w="50800"/>
+              <a:solidFill>
+                <a:schemeClr val="bg1">
+                  <a:shade val="50000"/>
+                </a:schemeClr>
+              </a:solidFill>
+              <a:effectLst/>
+            </a:endParaRPr>
           </a:p>
         </p:txBody>
       </p:sp>
@@ -5300,9 +6684,225 @@
   <p:timing>
     <p:tnLst>
       <p:par>
-        <p:cTn id="1" dur="indefinite" restart="never" nodeType="tmRoot"/>
+        <p:cTn id="1" dur="indefinite" restart="never" nodeType="tmRoot">
+          <p:childTnLst>
+            <p:seq concurrent="1" nextAc="seek">
+              <p:cTn id="2" dur="indefinite" nodeType="mainSeq">
+                <p:childTnLst>
+                  <p:par>
+                    <p:cTn id="3" fill="hold">
+                      <p:stCondLst>
+                        <p:cond delay="indefinite"/>
+                      </p:stCondLst>
+                      <p:childTnLst>
+                        <p:par>
+                          <p:cTn id="4" fill="hold">
+                            <p:stCondLst>
+                              <p:cond delay="0"/>
+                            </p:stCondLst>
+                            <p:childTnLst>
+                              <p:par>
+                                <p:cTn id="5" presetID="10" presetClass="entr" presetSubtype="0" fill="hold" grpId="0" nodeType="clickEffect">
+                                  <p:stCondLst>
+                                    <p:cond delay="0"/>
+                                  </p:stCondLst>
+                                  <p:childTnLst>
+                                    <p:set>
+                                      <p:cBhvr>
+                                        <p:cTn id="6" dur="1" fill="hold">
+                                          <p:stCondLst>
+                                            <p:cond delay="0"/>
+                                          </p:stCondLst>
+                                        </p:cTn>
+                                        <p:tgtEl>
+                                          <p:spTgt spid="4">
+                                            <p:txEl>
+                                              <p:pRg st="0" end="0"/>
+                                            </p:txEl>
+                                          </p:spTgt>
+                                        </p:tgtEl>
+                                        <p:attrNameLst>
+                                          <p:attrName>style.visibility</p:attrName>
+                                        </p:attrNameLst>
+                                      </p:cBhvr>
+                                      <p:to>
+                                        <p:strVal val="visible"/>
+                                      </p:to>
+                                    </p:set>
+                                    <p:animEffect transition="in" filter="fade">
+                                      <p:cBhvr>
+                                        <p:cTn id="7" dur="500"/>
+                                        <p:tgtEl>
+                                          <p:spTgt spid="4">
+                                            <p:txEl>
+                                              <p:pRg st="0" end="0"/>
+                                            </p:txEl>
+                                          </p:spTgt>
+                                        </p:tgtEl>
+                                      </p:cBhvr>
+                                    </p:animEffect>
+                                  </p:childTnLst>
+                                </p:cTn>
+                              </p:par>
+                              <p:par>
+                                <p:cTn id="8" presetID="10" presetClass="entr" presetSubtype="0" fill="hold" grpId="0" nodeType="withEffect">
+                                  <p:stCondLst>
+                                    <p:cond delay="0"/>
+                                  </p:stCondLst>
+                                  <p:childTnLst>
+                                    <p:set>
+                                      <p:cBhvr>
+                                        <p:cTn id="9" dur="1" fill="hold">
+                                          <p:stCondLst>
+                                            <p:cond delay="0"/>
+                                          </p:stCondLst>
+                                        </p:cTn>
+                                        <p:tgtEl>
+                                          <p:spTgt spid="4">
+                                            <p:txEl>
+                                              <p:pRg st="1" end="1"/>
+                                            </p:txEl>
+                                          </p:spTgt>
+                                        </p:tgtEl>
+                                        <p:attrNameLst>
+                                          <p:attrName>style.visibility</p:attrName>
+                                        </p:attrNameLst>
+                                      </p:cBhvr>
+                                      <p:to>
+                                        <p:strVal val="visible"/>
+                                      </p:to>
+                                    </p:set>
+                                    <p:animEffect transition="in" filter="fade">
+                                      <p:cBhvr>
+                                        <p:cTn id="10" dur="500"/>
+                                        <p:tgtEl>
+                                          <p:spTgt spid="4">
+                                            <p:txEl>
+                                              <p:pRg st="1" end="1"/>
+                                            </p:txEl>
+                                          </p:spTgt>
+                                        </p:tgtEl>
+                                      </p:cBhvr>
+                                    </p:animEffect>
+                                  </p:childTnLst>
+                                </p:cTn>
+                              </p:par>
+                              <p:par>
+                                <p:cTn id="11" presetID="10" presetClass="entr" presetSubtype="0" fill="hold" grpId="0" nodeType="withEffect">
+                                  <p:stCondLst>
+                                    <p:cond delay="0"/>
+                                  </p:stCondLst>
+                                  <p:childTnLst>
+                                    <p:set>
+                                      <p:cBhvr>
+                                        <p:cTn id="12" dur="1" fill="hold">
+                                          <p:stCondLst>
+                                            <p:cond delay="0"/>
+                                          </p:stCondLst>
+                                        </p:cTn>
+                                        <p:tgtEl>
+                                          <p:spTgt spid="4">
+                                            <p:txEl>
+                                              <p:pRg st="2" end="2"/>
+                                            </p:txEl>
+                                          </p:spTgt>
+                                        </p:tgtEl>
+                                        <p:attrNameLst>
+                                          <p:attrName>style.visibility</p:attrName>
+                                        </p:attrNameLst>
+                                      </p:cBhvr>
+                                      <p:to>
+                                        <p:strVal val="visible"/>
+                                      </p:to>
+                                    </p:set>
+                                    <p:animEffect transition="in" filter="fade">
+                                      <p:cBhvr>
+                                        <p:cTn id="13" dur="500"/>
+                                        <p:tgtEl>
+                                          <p:spTgt spid="4">
+                                            <p:txEl>
+                                              <p:pRg st="2" end="2"/>
+                                            </p:txEl>
+                                          </p:spTgt>
+                                        </p:tgtEl>
+                                      </p:cBhvr>
+                                    </p:animEffect>
+                                  </p:childTnLst>
+                                </p:cTn>
+                              </p:par>
+                              <p:par>
+                                <p:cTn id="14" presetID="10" presetClass="entr" presetSubtype="0" fill="hold" grpId="0" nodeType="withEffect">
+                                  <p:stCondLst>
+                                    <p:cond delay="0"/>
+                                  </p:stCondLst>
+                                  <p:childTnLst>
+                                    <p:set>
+                                      <p:cBhvr>
+                                        <p:cTn id="15" dur="1" fill="hold">
+                                          <p:stCondLst>
+                                            <p:cond delay="0"/>
+                                          </p:stCondLst>
+                                        </p:cTn>
+                                        <p:tgtEl>
+                                          <p:spTgt spid="4">
+                                            <p:txEl>
+                                              <p:pRg st="3" end="3"/>
+                                            </p:txEl>
+                                          </p:spTgt>
+                                        </p:tgtEl>
+                                        <p:attrNameLst>
+                                          <p:attrName>style.visibility</p:attrName>
+                                        </p:attrNameLst>
+                                      </p:cBhvr>
+                                      <p:to>
+                                        <p:strVal val="visible"/>
+                                      </p:to>
+                                    </p:set>
+                                    <p:animEffect transition="in" filter="fade">
+                                      <p:cBhvr>
+                                        <p:cTn id="16" dur="500"/>
+                                        <p:tgtEl>
+                                          <p:spTgt spid="4">
+                                            <p:txEl>
+                                              <p:pRg st="3" end="3"/>
+                                            </p:txEl>
+                                          </p:spTgt>
+                                        </p:tgtEl>
+                                      </p:cBhvr>
+                                    </p:animEffect>
+                                  </p:childTnLst>
+                                </p:cTn>
+                              </p:par>
+                            </p:childTnLst>
+                          </p:cTn>
+                        </p:par>
+                      </p:childTnLst>
+                    </p:cTn>
+                  </p:par>
+                </p:childTnLst>
+              </p:cTn>
+              <p:prevCondLst>
+                <p:cond evt="onPrev" delay="0">
+                  <p:tgtEl>
+                    <p:sldTgt/>
+                  </p:tgtEl>
+                </p:cond>
+              </p:prevCondLst>
+              <p:nextCondLst>
+                <p:cond evt="onNext" delay="0">
+                  <p:tgtEl>
+                    <p:sldTgt/>
+                  </p:tgtEl>
+                </p:cond>
+              </p:nextCondLst>
+            </p:seq>
+          </p:childTnLst>
+        </p:cTn>
       </p:par>
     </p:tnLst>
+    <p:bldLst>
+      <p:bldP spid="4" grpId="0" build="p"/>
+    </p:bldLst>
   </p:timing>
 </p:sld>
 </file>
@@ -5818,7 +7418,6 @@
               <a:rPr lang="en-US" sz="1600" dirty="0"/>
               <a:t>game continues with some kills and then one of the king is killed, then</a:t>
             </a:r>
-            <a:endParaRPr lang="en-US" sz="1600" dirty="0"/>
           </a:p>
           <a:p>
             <a:pPr lvl="2" fontAlgn="base"/>
@@ -5953,7 +7552,6 @@
               <a:rPr lang="en-US" sz="1800" dirty="0"/>
               <a:t>kills.</a:t>
             </a:r>
-            <a:endParaRPr lang="en-US" sz="1800" dirty="0"/>
           </a:p>
           <a:p>
             <a:r>
@@ -5982,7 +7580,6 @@
               <a:rPr lang="en-US" sz="1800" dirty="0"/>
               <a:t>.</a:t>
             </a:r>
-            <a:endParaRPr lang="en-US" sz="1800" dirty="0"/>
           </a:p>
           <a:p>
             <a:pPr lvl="2"/>
@@ -5990,7 +7587,6 @@
               <a:rPr lang="en-US" sz="1600" dirty="0"/>
               <a:t>1.If he isn't killed, the game is draw type 2, the player with more time gets points from his time (minutes left * 10) apart from the kill points.</a:t>
             </a:r>
-            <a:endParaRPr lang="en-US" sz="1600" dirty="0"/>
           </a:p>
           <a:p>
             <a:pPr lvl="2"/>
@@ -6845,13 +8441,13 @@
   <p:clrMapOvr>
     <a:masterClrMapping/>
   </p:clrMapOvr>
-  <mc:AlternateContent xmlns:mc="http://schemas.openxmlformats.org/markup-compatibility/2006">
-    <mc:Choice xmlns:p14="http://schemas.microsoft.com/office/powerpoint/2010/main" Requires="p14">
+  <mc:AlternateContent xmlns:mc="http://schemas.openxmlformats.org/markup-compatibility/2006" xmlns:p14="http://schemas.microsoft.com/office/powerpoint/2010/main">
+    <mc:Choice Requires="p14">
       <p:transition spd="slow" p14:dur="1500">
         <p:split orient="vert"/>
       </p:transition>
     </mc:Choice>
-    <mc:Fallback>
+    <mc:Fallback xmlns="">
       <p:transition spd="slow">
         <p:split orient="vert"/>
       </p:transition>
@@ -7014,13 +8610,13 @@
   <p:clrMapOvr>
     <a:masterClrMapping/>
   </p:clrMapOvr>
-  <mc:AlternateContent xmlns:mc="http://schemas.openxmlformats.org/markup-compatibility/2006">
-    <mc:Choice xmlns:p14="http://schemas.microsoft.com/office/powerpoint/2010/main" Requires="p14">
+  <mc:AlternateContent xmlns:mc="http://schemas.openxmlformats.org/markup-compatibility/2006" xmlns:p14="http://schemas.microsoft.com/office/powerpoint/2010/main">
+    <mc:Choice Requires="p14">
       <p:transition spd="slow" p14:dur="1500">
         <p:split orient="vert"/>
       </p:transition>
     </mc:Choice>
-    <mc:Fallback>
+    <mc:Fallback xmlns="">
       <p:transition spd="slow">
         <p:split orient="vert"/>
       </p:transition>

</xml_diff>